<commit_message>
feat(ui): Draw bounding boxes for any boxes with explicit outer dimensions
</commit_message>
<xml_diff>
--- a/LogoSlideMaker.WinUi/Sample/template.pptx
+++ b/LogoSlideMaker.WinUi/Sample/template.pptx
@@ -3382,10 +3382,10 @@
       </p:grpSpPr>
       <p:sp>
         <p:nvSpPr>
-          <p:cNvPr id="4" name="Rectangle 3">
-            <a:extLst>
-              <a:ext uri="{FF2B5EF4-FFF2-40B4-BE49-F238E27FC236}">
-                <a16:creationId xmlns:a16="http://schemas.microsoft.com/office/drawing/2014/main" id="{60D4A941-BEC2-21A4-E414-AFB01C4F24FC}"/>
+          <p:cNvPr id="2" name="Rectangle: Rounded Corners 1">
+            <a:extLst>
+              <a:ext uri="{FF2B5EF4-FFF2-40B4-BE49-F238E27FC236}">
+                <a16:creationId xmlns:a16="http://schemas.microsoft.com/office/drawing/2014/main" id="{A5422904-72D0-F917-7074-0223D86B85AC}"/>
               </a:ext>
             </a:extLst>
           </p:cNvPr>
@@ -3394,22 +3394,16 @@
         </p:nvSpPr>
         <p:spPr>
           <a:xfrm>
-            <a:off x="304799" y="304800"/>
-            <a:ext cx="5621867" cy="2976033"/>
+            <a:off x="304799" y="302344"/>
+            <a:ext cx="5623560" cy="2980944"/>
           </a:xfrm>
-          <a:prstGeom prst="rect">
+          <a:prstGeom prst="roundRect">
             <a:avLst/>
           </a:prstGeom>
           <a:solidFill>
             <a:schemeClr val="bg1"/>
           </a:solidFill>
-          <a:ln w="38100">
-            <a:solidFill>
-              <a:schemeClr val="accent2">
-                <a:lumMod val="75000"/>
-              </a:schemeClr>
-            </a:solidFill>
-          </a:ln>
+          <a:ln w="76200"/>
         </p:spPr>
         <p:style>
           <a:lnRef idx="2">
@@ -3438,10 +3432,10 @@
       </p:sp>
       <p:sp>
         <p:nvSpPr>
-          <p:cNvPr id="6" name="Rectangle 5">
-            <a:extLst>
-              <a:ext uri="{FF2B5EF4-FFF2-40B4-BE49-F238E27FC236}">
-                <a16:creationId xmlns:a16="http://schemas.microsoft.com/office/drawing/2014/main" id="{B1D632EE-BE20-182D-3063-A0E91CC64898}"/>
+          <p:cNvPr id="3" name="Rectangle: Rounded Corners 2">
+            <a:extLst>
+              <a:ext uri="{FF2B5EF4-FFF2-40B4-BE49-F238E27FC236}">
+                <a16:creationId xmlns:a16="http://schemas.microsoft.com/office/drawing/2014/main" id="{A8E6350B-E8C3-7B3C-FE2C-31A7587F2B41}"/>
               </a:ext>
             </a:extLst>
           </p:cNvPr>
@@ -3450,22 +3444,16 @@
         </p:nvSpPr>
         <p:spPr>
           <a:xfrm>
-            <a:off x="342347" y="3577167"/>
-            <a:ext cx="5621867" cy="2976033"/>
+            <a:off x="315383" y="3574713"/>
+            <a:ext cx="5623560" cy="2980944"/>
           </a:xfrm>
-          <a:prstGeom prst="rect">
+          <a:prstGeom prst="roundRect">
             <a:avLst/>
           </a:prstGeom>
           <a:solidFill>
             <a:schemeClr val="bg1"/>
           </a:solidFill>
-          <a:ln w="38100">
-            <a:solidFill>
-              <a:schemeClr val="accent2">
-                <a:lumMod val="75000"/>
-              </a:schemeClr>
-            </a:solidFill>
-          </a:ln>
+          <a:ln w="76200"/>
         </p:spPr>
         <p:style>
           <a:lnRef idx="2">
@@ -3494,10 +3482,10 @@
       </p:sp>
       <p:sp>
         <p:nvSpPr>
-          <p:cNvPr id="7" name="Rectangle 6">
-            <a:extLst>
-              <a:ext uri="{FF2B5EF4-FFF2-40B4-BE49-F238E27FC236}">
-                <a16:creationId xmlns:a16="http://schemas.microsoft.com/office/drawing/2014/main" id="{85446202-B459-3150-E5EE-F52362B45B13}"/>
+          <p:cNvPr id="5" name="Rectangle: Rounded Corners 4">
+            <a:extLst>
+              <a:ext uri="{FF2B5EF4-FFF2-40B4-BE49-F238E27FC236}">
+                <a16:creationId xmlns:a16="http://schemas.microsoft.com/office/drawing/2014/main" id="{84DAE6A5-91CB-A544-5B34-01F091BAE50E}"/>
               </a:ext>
             </a:extLst>
           </p:cNvPr>
@@ -3506,22 +3494,16 @@
         </p:nvSpPr>
         <p:spPr>
           <a:xfrm>
-            <a:off x="6254750" y="3577166"/>
-            <a:ext cx="5621867" cy="2976033"/>
+            <a:off x="6264489" y="299889"/>
+            <a:ext cx="5623560" cy="2980944"/>
           </a:xfrm>
-          <a:prstGeom prst="rect">
+          <a:prstGeom prst="roundRect">
             <a:avLst/>
           </a:prstGeom>
           <a:solidFill>
             <a:schemeClr val="bg1"/>
           </a:solidFill>
-          <a:ln w="38100">
-            <a:solidFill>
-              <a:schemeClr val="accent2">
-                <a:lumMod val="75000"/>
-              </a:schemeClr>
-            </a:solidFill>
-          </a:ln>
+          <a:ln w="76200"/>
         </p:spPr>
         <p:style>
           <a:lnRef idx="2">
@@ -3550,10 +3532,10 @@
       </p:sp>
       <p:sp>
         <p:nvSpPr>
-          <p:cNvPr id="8" name="Rectangle 7">
-            <a:extLst>
-              <a:ext uri="{FF2B5EF4-FFF2-40B4-BE49-F238E27FC236}">
-                <a16:creationId xmlns:a16="http://schemas.microsoft.com/office/drawing/2014/main" id="{F5C31931-666D-2C1F-E270-40A242682A4D}"/>
+          <p:cNvPr id="9" name="Rectangle: Rounded Corners 8">
+            <a:extLst>
+              <a:ext uri="{FF2B5EF4-FFF2-40B4-BE49-F238E27FC236}">
+                <a16:creationId xmlns:a16="http://schemas.microsoft.com/office/drawing/2014/main" id="{BC8648F1-9C98-C57C-34DE-D2A52BF95F77}"/>
               </a:ext>
             </a:extLst>
           </p:cNvPr>
@@ -3562,22 +3544,16 @@
         </p:nvSpPr>
         <p:spPr>
           <a:xfrm>
-            <a:off x="6265336" y="304800"/>
-            <a:ext cx="5621867" cy="2976033"/>
+            <a:off x="6253057" y="3572255"/>
+            <a:ext cx="5623560" cy="2980944"/>
           </a:xfrm>
-          <a:prstGeom prst="rect">
+          <a:prstGeom prst="roundRect">
             <a:avLst/>
           </a:prstGeom>
           <a:solidFill>
             <a:schemeClr val="bg1"/>
           </a:solidFill>
-          <a:ln w="38100">
-            <a:solidFill>
-              <a:schemeClr val="accent2">
-                <a:lumMod val="75000"/>
-              </a:schemeClr>
-            </a:solidFill>
-          </a:ln>
+          <a:ln w="76200"/>
         </p:spPr>
         <p:style>
           <a:lnRef idx="2">

</xml_diff>